<commit_message>
Kristiyans name war in der falschen schriftart und größe ... fml
</commit_message>
<xml_diff>
--- a/Documentation/Plakat.pptx
+++ b/Documentation/Plakat.pptx
@@ -244,7 +244,7 @@
           <a:p>
             <a:fld id="{34097DDA-2A78-C340-914C-950F1D24872B}" type="datetimeFigureOut">
               <a:rPr lang="en-DE" smtClean="0"/>
-              <a:t>23.03.23</a:t>
+              <a:t>03/24/2023</a:t>
             </a:fld>
             <a:endParaRPr lang="en-DE"/>
           </a:p>
@@ -286,7 +286,7 @@
           <a:p>
             <a:fld id="{C6D99BDC-E4DA-B647-B0EC-3BDEBE24FC8B}" type="slidenum">
               <a:rPr lang="en-DE" smtClean="0"/>
-              <a:t>‹#›</a:t>
+              <a:t>‹Nr.›</a:t>
             </a:fld>
             <a:endParaRPr lang="en-DE"/>
           </a:p>
@@ -414,7 +414,7 @@
           <a:p>
             <a:fld id="{34097DDA-2A78-C340-914C-950F1D24872B}" type="datetimeFigureOut">
               <a:rPr lang="en-DE" smtClean="0"/>
-              <a:t>23.03.23</a:t>
+              <a:t>03/24/2023</a:t>
             </a:fld>
             <a:endParaRPr lang="en-DE"/>
           </a:p>
@@ -456,7 +456,7 @@
           <a:p>
             <a:fld id="{C6D99BDC-E4DA-B647-B0EC-3BDEBE24FC8B}" type="slidenum">
               <a:rPr lang="en-DE" smtClean="0"/>
-              <a:t>‹#›</a:t>
+              <a:t>‹Nr.›</a:t>
             </a:fld>
             <a:endParaRPr lang="en-DE"/>
           </a:p>
@@ -594,7 +594,7 @@
           <a:p>
             <a:fld id="{34097DDA-2A78-C340-914C-950F1D24872B}" type="datetimeFigureOut">
               <a:rPr lang="en-DE" smtClean="0"/>
-              <a:t>23.03.23</a:t>
+              <a:t>03/24/2023</a:t>
             </a:fld>
             <a:endParaRPr lang="en-DE"/>
           </a:p>
@@ -636,7 +636,7 @@
           <a:p>
             <a:fld id="{C6D99BDC-E4DA-B647-B0EC-3BDEBE24FC8B}" type="slidenum">
               <a:rPr lang="en-DE" smtClean="0"/>
-              <a:t>‹#›</a:t>
+              <a:t>‹Nr.›</a:t>
             </a:fld>
             <a:endParaRPr lang="en-DE"/>
           </a:p>
@@ -764,7 +764,7 @@
           <a:p>
             <a:fld id="{34097DDA-2A78-C340-914C-950F1D24872B}" type="datetimeFigureOut">
               <a:rPr lang="en-DE" smtClean="0"/>
-              <a:t>23.03.23</a:t>
+              <a:t>03/24/2023</a:t>
             </a:fld>
             <a:endParaRPr lang="en-DE"/>
           </a:p>
@@ -806,7 +806,7 @@
           <a:p>
             <a:fld id="{C6D99BDC-E4DA-B647-B0EC-3BDEBE24FC8B}" type="slidenum">
               <a:rPr lang="en-DE" smtClean="0"/>
-              <a:t>‹#›</a:t>
+              <a:t>‹Nr.›</a:t>
             </a:fld>
             <a:endParaRPr lang="en-DE"/>
           </a:p>
@@ -1008,7 +1008,7 @@
           <a:p>
             <a:fld id="{34097DDA-2A78-C340-914C-950F1D24872B}" type="datetimeFigureOut">
               <a:rPr lang="en-DE" smtClean="0"/>
-              <a:t>23.03.23</a:t>
+              <a:t>03/24/2023</a:t>
             </a:fld>
             <a:endParaRPr lang="en-DE"/>
           </a:p>
@@ -1050,7 +1050,7 @@
           <a:p>
             <a:fld id="{C6D99BDC-E4DA-B647-B0EC-3BDEBE24FC8B}" type="slidenum">
               <a:rPr lang="en-DE" smtClean="0"/>
-              <a:t>‹#›</a:t>
+              <a:t>‹Nr.›</a:t>
             </a:fld>
             <a:endParaRPr lang="en-DE"/>
           </a:p>
@@ -1240,7 +1240,7 @@
           <a:p>
             <a:fld id="{34097DDA-2A78-C340-914C-950F1D24872B}" type="datetimeFigureOut">
               <a:rPr lang="en-DE" smtClean="0"/>
-              <a:t>23.03.23</a:t>
+              <a:t>03/24/2023</a:t>
             </a:fld>
             <a:endParaRPr lang="en-DE"/>
           </a:p>
@@ -1282,7 +1282,7 @@
           <a:p>
             <a:fld id="{C6D99BDC-E4DA-B647-B0EC-3BDEBE24FC8B}" type="slidenum">
               <a:rPr lang="en-DE" smtClean="0"/>
-              <a:t>‹#›</a:t>
+              <a:t>‹Nr.›</a:t>
             </a:fld>
             <a:endParaRPr lang="en-DE"/>
           </a:p>
@@ -1607,7 +1607,7 @@
           <a:p>
             <a:fld id="{34097DDA-2A78-C340-914C-950F1D24872B}" type="datetimeFigureOut">
               <a:rPr lang="en-DE" smtClean="0"/>
-              <a:t>23.03.23</a:t>
+              <a:t>03/24/2023</a:t>
             </a:fld>
             <a:endParaRPr lang="en-DE"/>
           </a:p>
@@ -1649,7 +1649,7 @@
           <a:p>
             <a:fld id="{C6D99BDC-E4DA-B647-B0EC-3BDEBE24FC8B}" type="slidenum">
               <a:rPr lang="en-DE" smtClean="0"/>
-              <a:t>‹#›</a:t>
+              <a:t>‹Nr.›</a:t>
             </a:fld>
             <a:endParaRPr lang="en-DE"/>
           </a:p>
@@ -1725,7 +1725,7 @@
           <a:p>
             <a:fld id="{34097DDA-2A78-C340-914C-950F1D24872B}" type="datetimeFigureOut">
               <a:rPr lang="en-DE" smtClean="0"/>
-              <a:t>23.03.23</a:t>
+              <a:t>03/24/2023</a:t>
             </a:fld>
             <a:endParaRPr lang="en-DE"/>
           </a:p>
@@ -1767,7 +1767,7 @@
           <a:p>
             <a:fld id="{C6D99BDC-E4DA-B647-B0EC-3BDEBE24FC8B}" type="slidenum">
               <a:rPr lang="en-DE" smtClean="0"/>
-              <a:t>‹#›</a:t>
+              <a:t>‹Nr.›</a:t>
             </a:fld>
             <a:endParaRPr lang="en-DE"/>
           </a:p>
@@ -1820,7 +1820,7 @@
           <a:p>
             <a:fld id="{34097DDA-2A78-C340-914C-950F1D24872B}" type="datetimeFigureOut">
               <a:rPr lang="en-DE" smtClean="0"/>
-              <a:t>23.03.23</a:t>
+              <a:t>03/24/2023</a:t>
             </a:fld>
             <a:endParaRPr lang="en-DE"/>
           </a:p>
@@ -1862,7 +1862,7 @@
           <a:p>
             <a:fld id="{C6D99BDC-E4DA-B647-B0EC-3BDEBE24FC8B}" type="slidenum">
               <a:rPr lang="en-DE" smtClean="0"/>
-              <a:t>‹#›</a:t>
+              <a:t>‹Nr.›</a:t>
             </a:fld>
             <a:endParaRPr lang="en-DE"/>
           </a:p>
@@ -2097,7 +2097,7 @@
           <a:p>
             <a:fld id="{34097DDA-2A78-C340-914C-950F1D24872B}" type="datetimeFigureOut">
               <a:rPr lang="en-DE" smtClean="0"/>
-              <a:t>23.03.23</a:t>
+              <a:t>03/24/2023</a:t>
             </a:fld>
             <a:endParaRPr lang="en-DE"/>
           </a:p>
@@ -2139,7 +2139,7 @@
           <a:p>
             <a:fld id="{C6D99BDC-E4DA-B647-B0EC-3BDEBE24FC8B}" type="slidenum">
               <a:rPr lang="en-DE" smtClean="0"/>
-              <a:t>‹#›</a:t>
+              <a:t>‹Nr.›</a:t>
             </a:fld>
             <a:endParaRPr lang="en-DE"/>
           </a:p>
@@ -2354,7 +2354,7 @@
           <a:p>
             <a:fld id="{34097DDA-2A78-C340-914C-950F1D24872B}" type="datetimeFigureOut">
               <a:rPr lang="en-DE" smtClean="0"/>
-              <a:t>23.03.23</a:t>
+              <a:t>03/24/2023</a:t>
             </a:fld>
             <a:endParaRPr lang="en-DE"/>
           </a:p>
@@ -2396,7 +2396,7 @@
           <a:p>
             <a:fld id="{C6D99BDC-E4DA-B647-B0EC-3BDEBE24FC8B}" type="slidenum">
               <a:rPr lang="en-DE" smtClean="0"/>
-              <a:t>‹#›</a:t>
+              <a:t>‹Nr.›</a:t>
             </a:fld>
             <a:endParaRPr lang="en-DE"/>
           </a:p>
@@ -2567,7 +2567,7 @@
           <a:p>
             <a:fld id="{34097DDA-2A78-C340-914C-950F1D24872B}" type="datetimeFigureOut">
               <a:rPr lang="en-DE" smtClean="0"/>
-              <a:t>23.03.23</a:t>
+              <a:t>03/24/2023</a:t>
             </a:fld>
             <a:endParaRPr lang="en-DE"/>
           </a:p>
@@ -2645,7 +2645,7 @@
           <a:p>
             <a:fld id="{C6D99BDC-E4DA-B647-B0EC-3BDEBE24FC8B}" type="slidenum">
               <a:rPr lang="en-DE" smtClean="0"/>
-              <a:t>‹#›</a:t>
+              <a:t>‹Nr.›</a:t>
             </a:fld>
             <a:endParaRPr lang="en-DE"/>
           </a:p>
@@ -4196,7 +4196,7 @@
         <p:spPr>
           <a:xfrm>
             <a:off x="5314923" y="28975980"/>
-            <a:ext cx="5672862" cy="553998"/>
+            <a:ext cx="5672862" cy="461665"/>
           </a:xfrm>
           <a:prstGeom prst="rect">
             <a:avLst/>
@@ -4214,10 +4214,11 @@
               <a:buChar char="•"/>
             </a:pPr>
             <a:r>
-              <a:rPr lang="en-DE" sz="3000" dirty="0">
+              <a:rPr lang="en-DE" sz="2400" dirty="0">
                 <a:solidFill>
                   <a:schemeClr val="bg1"/>
                 </a:solidFill>
+                <a:latin typeface="Montserrat" panose="00000500000000000000" pitchFamily="2" charset="0"/>
               </a:rPr>
               <a:t>Kristiyan Ivanov</a:t>
             </a:r>

</xml_diff>